<commit_message>
Update lesson slide decks
</commit_message>
<xml_diff>
--- a/mlu-dlti/Lessons/DEV_MLUDTI-EN-M1-L0.pptx
+++ b/mlu-dlti/Lessons/DEV_MLUDTI-EN-M1-L0.pptx
@@ -351,7 +351,7 @@
           <a:p>
             <a:fld id="{B9138B82-8250-4C8F-912C-3B4A740E81F1}" type="datetimeFigureOut">
               <a:rPr lang="en-US" smtClean="0"/>
-              <a:t>5/5/25</a:t>
+              <a:t>7/10/25</a:t>
             </a:fld>
             <a:endParaRPr lang="en-US" dirty="0"/>
           </a:p>
@@ -9551,7 +9551,7 @@
           <a:p>
             <a:fld id="{DA6CFF5C-CF8F-D042-9291-E9E11A5F8615}" type="datetimeFigureOut">
               <a:rPr lang="en-US" smtClean="0"/>
-              <a:t>5/5/25</a:t>
+              <a:t>7/10/25</a:t>
             </a:fld>
             <a:endParaRPr lang="en-US"/>
           </a:p>
@@ -11827,7 +11827,7 @@
           <a:p>
             <a:r>
               <a:rPr lang="en-US" dirty="0"/>
-              <a:t>Because it expresses the overall model error, the optimization process try to reach the minimum value</a:t>
+              <a:t>Because it expresses the overall model error, the optimization process tries to reach the minimum value</a:t>
             </a:r>
           </a:p>
           <a:p>
@@ -13488,8 +13488,8 @@
           </a:p>
         </p:txBody>
       </p:sp>
-      <mc:AlternateContent xmlns:mc="http://schemas.openxmlformats.org/markup-compatibility/2006">
-        <mc:Choice xmlns:a14="http://schemas.microsoft.com/office/drawing/2010/main" Requires="a14">
+      <mc:AlternateContent xmlns:mc="http://schemas.openxmlformats.org/markup-compatibility/2006" xmlns:a14="http://schemas.microsoft.com/office/drawing/2010/main">
+        <mc:Choice Requires="a14">
           <p:sp>
             <p:nvSpPr>
               <p:cNvPr id="3" name="Content Placeholder 2">
@@ -13814,7 +13814,7 @@
             </p:txBody>
           </p:sp>
         </mc:Choice>
-        <mc:Fallback>
+        <mc:Fallback xmlns="">
           <p:sp>
             <p:nvSpPr>
               <p:cNvPr id="3" name="Content Placeholder 2">
@@ -13947,8 +13947,8 @@
           </a:p>
         </p:txBody>
       </p:sp>
-      <mc:AlternateContent xmlns:mc="http://schemas.openxmlformats.org/markup-compatibility/2006">
-        <mc:Choice xmlns:a14="http://schemas.microsoft.com/office/drawing/2010/main" Requires="a14">
+      <mc:AlternateContent xmlns:mc="http://schemas.openxmlformats.org/markup-compatibility/2006" xmlns:a14="http://schemas.microsoft.com/office/drawing/2010/main">
+        <mc:Choice Requires="a14">
           <p:sp>
             <p:nvSpPr>
               <p:cNvPr id="3" name="Content Placeholder 2">
@@ -14152,7 +14152,7 @@
             </p:txBody>
           </p:sp>
         </mc:Choice>
-        <mc:Fallback>
+        <mc:Fallback xmlns="">
           <p:sp>
             <p:nvSpPr>
               <p:cNvPr id="3" name="Content Placeholder 2">
@@ -17473,7 +17473,7 @@
           <a:p>
             <a:r>
               <a:rPr lang="en-US" dirty="0"/>
-              <a:t>Each data sample is a piece of text that is stored as a file. For example, a data sample might be a sentence, chapter, or document.</a:t>
+              <a:t>Each data sample is a piece of text. For example, a data sample might be a sentence, chapter, or document.</a:t>
             </a:r>
           </a:p>
           <a:p>

</xml_diff>